<commit_message>
Changed cn S/W discriptions
</commit_message>
<xml_diff>
--- a/2021-04-12to04-16 (A5) C53517 SoftMARS/20_10v01_MarsBaseAlpha_OpeningBriefing.pptx
+++ b/2021-04-12to04-16 (A5) C53517 SoftMARS/20_10v01_MarsBaseAlpha_OpeningBriefing.pptx
@@ -261,7 +261,7 @@
           <a:p>
             <a:fld id="{F319E496-E8FF-4856-B08F-DBE14D18B236}" type="datetimeFigureOut">
               <a:rPr lang="en-US" smtClean="0"/>
-              <a:t>7/12/2021</a:t>
+              <a:t>8/9/2021</a:t>
             </a:fld>
             <a:endParaRPr lang="en-US"/>
           </a:p>
@@ -438,7 +438,7 @@
           <a:p>
             <a:fld id="{4572F63B-EF0F-9942-98B2-F67CC88AF236}" type="datetimeFigureOut">
               <a:rPr lang="en-US" smtClean="0"/>
-              <a:t>7/12/2021</a:t>
+              <a:t>8/9/2021</a:t>
             </a:fld>
             <a:endParaRPr lang="en-US"/>
           </a:p>
@@ -1612,7 +1612,7 @@
               </a14:hiddenLine>
             </a:ext>
             <a:ext uri="{FAA26D3D-D897-4be2-8F04-BA451C77F1D7}">
-              <ma14:placeholderFlag xmlns:ma14="http://schemas.microsoft.com/office/mac/drawingml/2011/main" xmlns="" val="1"/>
+              <ma14:placeholderFlag xmlns="" xmlns:ma14="http://schemas.microsoft.com/office/mac/drawingml/2011/main" val="1"/>
             </a:ext>
           </a:extLst>
         </p:spPr>
@@ -2060,7 +2060,7 @@
               </a14:hiddenLine>
             </a:ext>
             <a:ext uri="{FAA26D3D-D897-4be2-8F04-BA451C77F1D7}">
-              <ma14:placeholderFlag xmlns:ma14="http://schemas.microsoft.com/office/mac/drawingml/2011/main" xmlns="" val="1"/>
+              <ma14:placeholderFlag xmlns="" xmlns:ma14="http://schemas.microsoft.com/office/mac/drawingml/2011/main" val="1"/>
             </a:ext>
           </a:extLst>
         </p:spPr>
@@ -2314,7 +2314,7 @@
               </a14:hiddenLine>
             </a:ext>
             <a:ext uri="{FAA26D3D-D897-4be2-8F04-BA451C77F1D7}">
-              <ma14:placeholderFlag xmlns:ma14="http://schemas.microsoft.com/office/mac/drawingml/2011/main" xmlns="" val="1"/>
+              <ma14:placeholderFlag xmlns="" xmlns:ma14="http://schemas.microsoft.com/office/mac/drawingml/2011/main" val="1"/>
             </a:ext>
           </a:extLst>
         </p:spPr>
@@ -2568,7 +2568,7 @@
               </a14:hiddenLine>
             </a:ext>
             <a:ext uri="{FAA26D3D-D897-4be2-8F04-BA451C77F1D7}">
-              <ma14:placeholderFlag xmlns:ma14="http://schemas.microsoft.com/office/mac/drawingml/2011/main" xmlns="" val="1"/>
+              <ma14:placeholderFlag xmlns="" xmlns:ma14="http://schemas.microsoft.com/office/mac/drawingml/2011/main" val="1"/>
             </a:ext>
           </a:extLst>
         </p:spPr>
@@ -3117,7 +3117,7 @@
               </a14:hiddenLine>
             </a:ext>
             <a:ext uri="{FAA26D3D-D897-4be2-8F04-BA451C77F1D7}">
-              <ma14:placeholderFlag xmlns:ma14="http://schemas.microsoft.com/office/mac/drawingml/2011/main" xmlns="" val="1"/>
+              <ma14:placeholderFlag xmlns="" xmlns:ma14="http://schemas.microsoft.com/office/mac/drawingml/2011/main" val="1"/>
             </a:ext>
           </a:extLst>
         </p:spPr>
@@ -5664,14 +5664,14 @@
           </a:ln>
           <a:extLst>
             <a:ext uri="{909E8E84-426E-40dd-AFC4-6F175D3DCCD1}">
-              <a14:hiddenFill xmlns="" xmlns:a14="http://schemas.microsoft.com/office/drawing/2010/main">
+              <a14:hiddenFill xmlns:a14="http://schemas.microsoft.com/office/drawing/2010/main" xmlns="">
                 <a:solidFill>
                   <a:schemeClr val="accent1"/>
                 </a:solidFill>
               </a14:hiddenFill>
             </a:ext>
             <a:ext uri="{91240B29-F687-4f45-9708-019B960494DF}">
-              <a14:hiddenLine xmlns="" xmlns:a14="http://schemas.microsoft.com/office/drawing/2010/main" w="9525">
+              <a14:hiddenLine xmlns:a14="http://schemas.microsoft.com/office/drawing/2010/main" xmlns="" w="9525">
                 <a:solidFill>
                   <a:schemeClr val="tx1"/>
                 </a:solidFill>
@@ -8227,7 +8227,7 @@
           </a:p>
           <a:p>
             <a:r>
-              <a:rPr lang="zh-CN" altLang="en-US" sz="1600" dirty="0">
+              <a:rPr lang="zh-CN" altLang="en-US" sz="2000" dirty="0">
                 <a:solidFill>
                   <a:srgbClr val="1F497D"/>
                 </a:solidFill>
@@ -8238,7 +8238,7 @@
           <a:p>
             <a:pPr lvl="1"/>
             <a:r>
-              <a:rPr lang="zh-CN" altLang="en-US" sz="1600" dirty="0">
+              <a:rPr lang="zh-CN" altLang="en-US" sz="1800" dirty="0">
                 <a:solidFill>
                   <a:srgbClr val="1F497D"/>
                 </a:solidFill>
@@ -8246,7 +8246,7 @@
               <a:t>弱项</a:t>
             </a:r>
             <a:r>
-              <a:rPr lang="en-US" altLang="zh-CN" sz="1600" dirty="0">
+              <a:rPr lang="en-US" altLang="zh-CN" sz="1800" dirty="0">
                 <a:solidFill>
                   <a:srgbClr val="1F497D"/>
                 </a:solidFill>
@@ -8254,111 +8254,31 @@
               <a:t>——</a:t>
             </a:r>
             <a:r>
-              <a:rPr lang="zh-CN" altLang="en-US" sz="1600" dirty="0">
+              <a:rPr lang="zh-CN" altLang="en-US" sz="1800" dirty="0">
                 <a:solidFill>
                   <a:srgbClr val="1F497D"/>
                 </a:solidFill>
               </a:rPr>
-              <a:t>一种初步或最终发现</a:t>
-            </a:r>
-            <a:r>
-              <a:rPr lang="en-US" altLang="zh-CN" sz="1600" dirty="0">
+              <a:t>一种初步或最终的发现，是指一个或多个过程实施无效或缺乏实施，这些过程基于已验证的客观证据，符合实践的意图和价值，适用于整个项目和组织支持职能组或组织单元。这可以通过以下两种方式实现：</a:t>
+            </a:r>
+            <a:r>
+              <a:rPr lang="en-US" altLang="zh-CN" sz="1800" dirty="0">
                 <a:solidFill>
                   <a:srgbClr val="1F497D"/>
                 </a:solidFill>
               </a:rPr>
-              <a:t>,</a:t>
-            </a:r>
-            <a:r>
-              <a:rPr lang="zh-CN" altLang="en-US" sz="1600" dirty="0">
+              <a:t>a</a:t>
+            </a:r>
+            <a:r>
+              <a:rPr lang="zh-CN" altLang="en-US" sz="1800" dirty="0">
                 <a:solidFill>
                   <a:srgbClr val="1F497D"/>
                 </a:solidFill>
               </a:rPr>
-              <a:t>这是一个无效</a:t>
-            </a:r>
-            <a:r>
-              <a:rPr lang="en-US" altLang="zh-CN" sz="1600" dirty="0">
-                <a:solidFill>
-                  <a:srgbClr val="1F497D"/>
-                </a:solidFill>
-              </a:rPr>
-              <a:t>,</a:t>
-            </a:r>
-            <a:r>
-              <a:rPr lang="zh-CN" altLang="en-US" sz="1600" dirty="0">
-                <a:solidFill>
-                  <a:srgbClr val="1F497D"/>
-                </a:solidFill>
-              </a:rPr>
-              <a:t>或缺乏</a:t>
-            </a:r>
-            <a:r>
-              <a:rPr lang="en-US" altLang="zh-CN" sz="1600" dirty="0">
-                <a:solidFill>
-                  <a:srgbClr val="1F497D"/>
-                </a:solidFill>
-              </a:rPr>
-              <a:t>,</a:t>
-            </a:r>
-            <a:r>
-              <a:rPr lang="zh-CN" altLang="en-US" sz="1600" dirty="0">
-                <a:solidFill>
-                  <a:srgbClr val="1F497D"/>
-                </a:solidFill>
-              </a:rPr>
-              <a:t>实现一个或多个过程满足的意图和价值实践验证客观证据的基础上</a:t>
-            </a:r>
-            <a:r>
-              <a:rPr lang="en-US" altLang="zh-CN" sz="1600" dirty="0">
-                <a:solidFill>
-                  <a:srgbClr val="1F497D"/>
-                </a:solidFill>
-              </a:rPr>
-              <a:t>,</a:t>
-            </a:r>
-            <a:r>
-              <a:rPr lang="zh-CN" altLang="en-US" sz="1600" dirty="0">
-                <a:solidFill>
-                  <a:srgbClr val="1F497D"/>
-                </a:solidFill>
-              </a:rPr>
-              <a:t>和适用的项目</a:t>
-            </a:r>
-            <a:r>
-              <a:rPr lang="en-US" altLang="zh-CN" sz="1600" dirty="0">
-                <a:solidFill>
-                  <a:srgbClr val="1F497D"/>
-                </a:solidFill>
-              </a:rPr>
-              <a:t>(s)</a:t>
-            </a:r>
-            <a:r>
-              <a:rPr lang="zh-CN" altLang="en-US" sz="1600" dirty="0">
-                <a:solidFill>
-                  <a:srgbClr val="1F497D"/>
-                </a:solidFill>
-              </a:rPr>
-              <a:t>和组织支持函数或组织单元作为一个整体。这要么是由</a:t>
-            </a:r>
-            <a:r>
-              <a:rPr lang="en-US" altLang="zh-CN" sz="1600" dirty="0">
-                <a:solidFill>
-                  <a:srgbClr val="1F497D"/>
-                </a:solidFill>
-              </a:rPr>
-              <a:t>a)</a:t>
-            </a:r>
-            <a:r>
-              <a:rPr lang="zh-CN" altLang="en-US" sz="1600" dirty="0">
-                <a:solidFill>
-                  <a:srgbClr val="1F497D"/>
-                </a:solidFill>
-              </a:rPr>
-              <a:t>过程本身没有满足</a:t>
-            </a:r>
-            <a:r>
-              <a:rPr lang="en-US" altLang="zh-CN" sz="1600" dirty="0">
+              <a:t>）过程本身没有满足</a:t>
+            </a:r>
+            <a:r>
+              <a:rPr lang="en-US" altLang="zh-CN" sz="1800" dirty="0">
                 <a:solidFill>
                   <a:srgbClr val="1F497D"/>
                 </a:solidFill>
@@ -8366,31 +8286,31 @@
               <a:t>CMMI</a:t>
             </a:r>
             <a:r>
-              <a:rPr lang="zh-CN" altLang="en-US" sz="1600" dirty="0">
+              <a:rPr lang="zh-CN" altLang="en-US" sz="1800" dirty="0">
                 <a:solidFill>
                   <a:srgbClr val="1F497D"/>
                 </a:solidFill>
               </a:rPr>
-              <a:t>实践需求，要么是由</a:t>
-            </a:r>
-            <a:r>
-              <a:rPr lang="en-US" altLang="zh-CN" sz="1600" dirty="0">
+              <a:t>实践需求，或者</a:t>
+            </a:r>
+            <a:r>
+              <a:rPr lang="en-US" altLang="zh-CN" sz="1800" dirty="0">
                 <a:solidFill>
                   <a:srgbClr val="1F497D"/>
                 </a:solidFill>
               </a:rPr>
-              <a:t>b)</a:t>
-            </a:r>
-            <a:r>
-              <a:rPr lang="zh-CN" altLang="en-US" sz="1600" dirty="0">
+              <a:t>b</a:t>
+            </a:r>
+            <a:r>
+              <a:rPr lang="zh-CN" altLang="en-US" sz="1800" dirty="0">
                 <a:solidFill>
                   <a:srgbClr val="1F497D"/>
                 </a:solidFill>
               </a:rPr>
-              <a:t>项目或组织支持功能没有遵循它们的过程，而这些过程与适用的</a:t>
-            </a:r>
-            <a:r>
-              <a:rPr lang="en-US" altLang="zh-CN" sz="1600" dirty="0">
+              <a:t>）项目或组织支持职能组没有遵循符合适用</a:t>
+            </a:r>
+            <a:r>
+              <a:rPr lang="en-US" altLang="zh-CN" sz="1800" dirty="0">
                 <a:solidFill>
                   <a:srgbClr val="1F497D"/>
                 </a:solidFill>
@@ -8398,14 +8318,14 @@
               <a:t>CMMI</a:t>
             </a:r>
             <a:r>
-              <a:rPr lang="zh-CN" altLang="en-US" sz="1600" dirty="0">
+              <a:rPr lang="zh-CN" altLang="en-US" sz="1800" dirty="0">
                 <a:solidFill>
                   <a:srgbClr val="1F497D"/>
                 </a:solidFill>
               </a:rPr>
-              <a:t>实践的意图和价值是一致的。</a:t>
-            </a:r>
-            <a:endParaRPr lang="en-ZA" altLang="zh-CN" sz="1600" dirty="0">
+              <a:t>实践意图和价值的过程。</a:t>
+            </a:r>
+            <a:endParaRPr lang="en-ZA" altLang="zh-CN" sz="1800" dirty="0">
               <a:solidFill>
                 <a:srgbClr val="1F497D"/>
               </a:solidFill>
@@ -8414,45 +8334,58 @@
           <a:p>
             <a:pPr lvl="1"/>
             <a:r>
-              <a:rPr lang="zh-CN" altLang="en-US" sz="1600" dirty="0">
+              <a:rPr lang="zh-CN" altLang="en-US" sz="1800" dirty="0">
                 <a:solidFill>
                   <a:srgbClr val="1F497D"/>
                 </a:solidFill>
               </a:rPr>
-              <a:t>优势 </a:t>
-            </a:r>
-            <a:r>
-              <a:rPr lang="en-US" altLang="zh-CN" sz="1600" dirty="0">
+              <a:t>强项</a:t>
+            </a:r>
+            <a:r>
+              <a:rPr lang="en-US" altLang="zh-CN" sz="1800" dirty="0">
                 <a:solidFill>
                   <a:srgbClr val="1F497D"/>
                 </a:solidFill>
               </a:rPr>
-              <a:t>- </a:t>
-            </a:r>
-            <a:r>
-              <a:rPr lang="zh-CN" altLang="en-US" sz="1600" dirty="0">
+              <a:t>——</a:t>
+            </a:r>
+            <a:r>
+              <a:rPr lang="zh-CN" altLang="en-US" sz="1800" dirty="0">
                 <a:solidFill>
                   <a:srgbClr val="1F497D"/>
                 </a:solidFill>
               </a:rPr>
-              <a:t>一种初步或最终发现，是符合 </a:t>
-            </a:r>
-            <a:r>
-              <a:rPr lang="en-US" altLang="zh-CN" sz="1600" dirty="0">
+              <a:t>一种初步或最终的发现，是一个模范性或值得注意的过程实现，其符合</a:t>
+            </a:r>
+            <a:r>
+              <a:rPr lang="en-US" altLang="zh-CN" sz="1800" dirty="0">
                 <a:solidFill>
                   <a:srgbClr val="1F497D"/>
                 </a:solidFill>
               </a:rPr>
-              <a:t>CMMI </a:t>
-            </a:r>
-            <a:r>
-              <a:rPr lang="zh-CN" altLang="en-US" sz="1600" dirty="0">
+              <a:t>CMMI</a:t>
+            </a:r>
+            <a:r>
+              <a:rPr lang="zh-CN" altLang="en-US" sz="1800">
                 <a:solidFill>
                   <a:srgbClr val="1F497D"/>
                 </a:solidFill>
               </a:rPr>
-              <a:t>模型实践意图和价值的过程的模范或值得注意的执行。</a:t>
-            </a:r>
+              <a:t>模型实践的意图和价值</a:t>
+            </a:r>
+            <a:r>
+              <a:rPr lang="zh-CN" altLang="en-US" sz="1600">
+                <a:solidFill>
+                  <a:srgbClr val="1F497D"/>
+                </a:solidFill>
+              </a:rPr>
+              <a:t>。</a:t>
+            </a:r>
+            <a:endParaRPr lang="zh-CN" altLang="en-US" sz="1600" dirty="0">
+              <a:solidFill>
+                <a:srgbClr val="1F497D"/>
+              </a:solidFill>
+            </a:endParaRPr>
           </a:p>
           <a:p>
             <a:pPr lvl="1"/>
@@ -12902,6 +12835,21 @@
 </file>
 
 <file path=customXml/item1.xml><?xml version="1.0" encoding="utf-8"?>
+<?mso-contentType ?>
+<FormTemplates xmlns="http://schemas.microsoft.com/sharepoint/v3/contenttype/forms">
+  <Display>DocumentLibraryForm</Display>
+  <Edit>DocumentLibraryForm</Edit>
+  <New>DocumentLibraryForm</New>
+</FormTemplates>
+</file>
+
+<file path=customXml/item2.xml><?xml version="1.0" encoding="utf-8"?>
+<p:properties xmlns:p="http://schemas.microsoft.com/office/2006/metadata/properties" xmlns:xsi="http://www.w3.org/2001/XMLSchema-instance" xmlns:pc="http://schemas.microsoft.com/office/infopath/2007/PartnerControls">
+  <documentManagement/>
+</p:properties>
+</file>
+
+<file path=customXml/item3.xml><?xml version="1.0" encoding="utf-8"?>
 <ct:contentTypeSchema xmlns:ct="http://schemas.microsoft.com/office/2006/metadata/contentType" xmlns:ma="http://schemas.microsoft.com/office/2006/metadata/properties/metaAttributes" ct:_="" ma:_="" ma:contentTypeName="Document" ma:contentTypeID="0x0101001F513751AC33344AB32CFD2920EFE649" ma:contentTypeVersion="11" ma:contentTypeDescription="Create a new document." ma:contentTypeScope="" ma:versionID="683516f7d70434a0e4dbd6c476be8d5b">
   <xsd:schema xmlns:xsd="http://www.w3.org/2001/XMLSchema" xmlns:xs="http://www.w3.org/2001/XMLSchema" xmlns:p="http://schemas.microsoft.com/office/2006/metadata/properties" xmlns:ns2="72e3a154-4955-46c3-9573-e9dec3e1f195" xmlns:ns3="ec500478-62e0-46fc-87f1-cfa988e486b4" targetNamespace="http://schemas.microsoft.com/office/2006/metadata/properties" ma:root="true" ma:fieldsID="cf4a15c6a1eec5dbba94230cc6a50510" ns2:_="" ns3:_="">
     <xsd:import namespace="72e3a154-4955-46c3-9573-e9dec3e1f195"/>
@@ -13112,36 +13060,10 @@
 </ct:contentTypeSchema>
 </file>
 
-<file path=customXml/item2.xml><?xml version="1.0" encoding="utf-8"?>
-<p:properties xmlns:p="http://schemas.microsoft.com/office/2006/metadata/properties" xmlns:xsi="http://www.w3.org/2001/XMLSchema-instance" xmlns:pc="http://schemas.microsoft.com/office/infopath/2007/PartnerControls">
-  <documentManagement/>
-</p:properties>
-</file>
-
-<file path=customXml/item3.xml><?xml version="1.0" encoding="utf-8"?>
-<?mso-contentType ?>
-<FormTemplates xmlns="http://schemas.microsoft.com/sharepoint/v3/contenttype/forms">
-  <Display>DocumentLibraryForm</Display>
-  <Edit>DocumentLibraryForm</Edit>
-  <New>DocumentLibraryForm</New>
-</FormTemplates>
-</file>
-
 <file path=customXml/itemProps1.xml><?xml version="1.0" encoding="utf-8"?>
-<ds:datastoreItem xmlns:ds="http://schemas.openxmlformats.org/officeDocument/2006/customXml" ds:itemID="{153C8246-6D75-4965-9C67-AB8DC9AA7365}">
+<ds:datastoreItem xmlns:ds="http://schemas.openxmlformats.org/officeDocument/2006/customXml" ds:itemID="{B8B49826-D5EE-4D24-B649-7C3A19B527D2}">
   <ds:schemaRefs>
-    <ds:schemaRef ds:uri="http://schemas.microsoft.com/office/2006/metadata/contentType"/>
-    <ds:schemaRef ds:uri="http://schemas.microsoft.com/office/2006/metadata/properties/metaAttributes"/>
-    <ds:schemaRef ds:uri="http://www.w3.org/2001/XMLSchema"/>
-    <ds:schemaRef ds:uri="http://schemas.microsoft.com/office/2006/metadata/properties"/>
-    <ds:schemaRef ds:uri="72e3a154-4955-46c3-9573-e9dec3e1f195"/>
-    <ds:schemaRef ds:uri="ec500478-62e0-46fc-87f1-cfa988e486b4"/>
-    <ds:schemaRef ds:uri="http://schemas.microsoft.com/office/2006/documentManagement/types"/>
-    <ds:schemaRef ds:uri="http://schemas.microsoft.com/office/infopath/2007/PartnerControls"/>
-    <ds:schemaRef ds:uri="http://schemas.openxmlformats.org/package/2006/metadata/core-properties"/>
-    <ds:schemaRef ds:uri="http://purl.org/dc/elements/1.1/"/>
-    <ds:schemaRef ds:uri="http://purl.org/dc/terms/"/>
-    <ds:schemaRef ds:uri="http://schemas.microsoft.com/internal/obd"/>
+    <ds:schemaRef ds:uri="http://schemas.microsoft.com/sharepoint/v3/contenttype/forms"/>
   </ds:schemaRefs>
 </ds:datastoreItem>
 </file>
@@ -13162,9 +13084,20 @@
 </file>
 
 <file path=customXml/itemProps3.xml><?xml version="1.0" encoding="utf-8"?>
-<ds:datastoreItem xmlns:ds="http://schemas.openxmlformats.org/officeDocument/2006/customXml" ds:itemID="{B8B49826-D5EE-4D24-B649-7C3A19B527D2}">
+<ds:datastoreItem xmlns:ds="http://schemas.openxmlformats.org/officeDocument/2006/customXml" ds:itemID="{153C8246-6D75-4965-9C67-AB8DC9AA7365}">
   <ds:schemaRefs>
-    <ds:schemaRef ds:uri="http://schemas.microsoft.com/sharepoint/v3/contenttype/forms"/>
+    <ds:schemaRef ds:uri="http://schemas.microsoft.com/office/2006/metadata/contentType"/>
+    <ds:schemaRef ds:uri="http://schemas.microsoft.com/office/2006/metadata/properties/metaAttributes"/>
+    <ds:schemaRef ds:uri="http://www.w3.org/2001/XMLSchema"/>
+    <ds:schemaRef ds:uri="http://schemas.microsoft.com/office/2006/metadata/properties"/>
+    <ds:schemaRef ds:uri="72e3a154-4955-46c3-9573-e9dec3e1f195"/>
+    <ds:schemaRef ds:uri="ec500478-62e0-46fc-87f1-cfa988e486b4"/>
+    <ds:schemaRef ds:uri="http://schemas.microsoft.com/office/2006/documentManagement/types"/>
+    <ds:schemaRef ds:uri="http://schemas.microsoft.com/office/infopath/2007/PartnerControls"/>
+    <ds:schemaRef ds:uri="http://schemas.openxmlformats.org/package/2006/metadata/core-properties"/>
+    <ds:schemaRef ds:uri="http://purl.org/dc/elements/1.1/"/>
+    <ds:schemaRef ds:uri="http://purl.org/dc/terms/"/>
+    <ds:schemaRef ds:uri="http://schemas.microsoft.com/internal/obd"/>
   </ds:schemaRefs>
 </ds:datastoreItem>
 </file>
</xml_diff>